<commit_message>
Changed Methodology for poster
</commit_message>
<xml_diff>
--- a/Poster_CNN.pptx
+++ b/Poster_CNN.pptx
@@ -2203,7 +2203,7 @@
               <a:graphicData uri="http://schemas.openxmlformats.org/presentationml/2006/ole">
                 <mc:AlternateContent xmlns:mc="http://schemas.openxmlformats.org/markup-compatibility/2006">
                   <mc:Choice xmlns:v="urn:schemas-microsoft-com:vml" Requires="v">
-                    <p:oleObj spid="_x0000_s1362" name="Image" r:id="rId8" imgW="1828571" imgH="1117460" progId="">
+                    <p:oleObj spid="_x0000_s1370" name="Image" r:id="rId8" imgW="1828571" imgH="1117460" progId="">
                       <p:embed/>
                     </p:oleObj>
                   </mc:Choice>
@@ -2275,7 +2275,7 @@
               <a:graphicData uri="http://schemas.openxmlformats.org/presentationml/2006/ole">
                 <mc:AlternateContent xmlns:mc="http://schemas.openxmlformats.org/markup-compatibility/2006">
                   <mc:Choice xmlns:v="urn:schemas-microsoft-com:vml" Requires="v">
-                    <p:oleObj spid="_x0000_s1363" name="Image" r:id="rId10" imgW="1828571" imgH="1117460" progId="">
+                    <p:oleObj spid="_x0000_s1371" name="Image" r:id="rId10" imgW="1828571" imgH="1117460" progId="">
                       <p:embed/>
                     </p:oleObj>
                   </mc:Choice>
@@ -3324,7 +3324,7 @@
             <a:graphicData uri="http://schemas.openxmlformats.org/presentationml/2006/ole">
               <mc:AlternateContent xmlns:mc="http://schemas.openxmlformats.org/markup-compatibility/2006">
                 <mc:Choice xmlns:v="urn:schemas-microsoft-com:vml" Requires="v">
-                  <p:oleObj spid="_x0000_s1364" name="Image" r:id="rId12" imgW="4571429" imgH="1688889" progId="">
+                  <p:oleObj spid="_x0000_s1372" name="Image" r:id="rId12" imgW="4571429" imgH="1688889" progId="">
                     <p:embed/>
                   </p:oleObj>
                 </mc:Choice>
@@ -3423,7 +3423,7 @@
             <a:graphicData uri="http://schemas.openxmlformats.org/presentationml/2006/ole">
               <mc:AlternateContent xmlns:mc="http://schemas.openxmlformats.org/markup-compatibility/2006">
                 <mc:Choice xmlns:v="urn:schemas-microsoft-com:vml" Requires="v">
-                  <p:oleObj spid="_x0000_s1365" name="Image" r:id="rId15" imgW="1574603" imgH="1053968" progId="">
+                  <p:oleObj spid="_x0000_s1373" name="Image" r:id="rId15" imgW="1574603" imgH="1053968" progId="">
                     <p:embed/>
                   </p:oleObj>
                 </mc:Choice>
@@ -4922,23 +4922,7 @@
             </a:r>
             <a:r>
               <a:rPr lang="en-US" sz="2400" dirty="0"/>
-              <a:t> a nonlinear Activation Function which makes it easy for the model to generalize or adapt with variety of data and to differentiate between the output. is an element wise operation (applied per pixel) and replaces all negative pixel values in the feature map by zero. The purpose of </a:t>
-            </a:r>
-            <a:r>
-              <a:rPr lang="en-US" sz="2400" dirty="0" err="1"/>
-              <a:t>ReLU</a:t>
-            </a:r>
-            <a:r>
-              <a:rPr lang="en-US" sz="2400" dirty="0"/>
-              <a:t> is to introduce non-linearity in our </a:t>
-            </a:r>
-            <a:r>
-              <a:rPr lang="en-US" sz="2400" dirty="0" err="1"/>
-              <a:t>ConvNet</a:t>
-            </a:r>
-            <a:r>
-              <a:rPr lang="en-US" sz="2400" dirty="0"/>
-              <a:t>.</a:t>
+              <a:t> a nonlinear Activation Function which makes it easy for the model to generalize or adapt with variety of data and to differentiate between the output is an element wise operation (applied per pixel) and replaces all negative pixel values in the feature map by zero. </a:t>
             </a:r>
           </a:p>
           <a:p>
@@ -5053,8 +5037,12 @@
           <a:p>
             <a:pPr algn="just"/>
             <a:r>
+              <a:rPr lang="en-US" sz="2400"/>
+              <a:t>The </a:t>
+            </a:r>
+            <a:r>
               <a:rPr lang="en-US" sz="2400" dirty="0"/>
-              <a:t>The Fully Connected layer is a traditional Multi Layer Perceptron that uses a </a:t>
+              <a:t>Fully Connected layer is a traditional Multi Layer Perceptron that uses a </a:t>
             </a:r>
             <a:r>
               <a:rPr lang="en-US" sz="2400" dirty="0" err="1"/>
@@ -5614,7 +5602,7 @@
         </p:blipFill>
         <p:spPr>
           <a:xfrm>
-            <a:off x="7458136" y="13546982"/>
+            <a:off x="7406553" y="13200097"/>
             <a:ext cx="3184757" cy="2487365"/>
           </a:xfrm>
           <a:prstGeom prst="rect">
@@ -5636,7 +5624,7 @@
         </p:nvSpPr>
         <p:spPr>
           <a:xfrm>
-            <a:off x="10808653" y="14244177"/>
+            <a:off x="10823397" y="13984592"/>
             <a:ext cx="1408652" cy="1025991"/>
           </a:xfrm>
           <a:prstGeom prst="rightArrow">
@@ -5693,7 +5681,7 @@
         </p:blipFill>
         <p:spPr>
           <a:xfrm>
-            <a:off x="12564840" y="14239875"/>
+            <a:off x="12540785" y="13984592"/>
             <a:ext cx="1295400" cy="1009650"/>
           </a:xfrm>
           <a:prstGeom prst="rect">
@@ -5729,7 +5717,7 @@
         </p:blipFill>
         <p:spPr>
           <a:xfrm>
-            <a:off x="7277167" y="19765485"/>
+            <a:off x="7388213" y="19404560"/>
             <a:ext cx="6890553" cy="3542174"/>
           </a:xfrm>
           <a:prstGeom prst="rect">

</xml_diff>